<commit_message>
- Finished the initial work on the project specification. Need to have it checked for semi-completeness. Implementation is next :) - Also removed the AssemblyInfo.BuildInformation.cs files. They'll be automatically generated so they don't need to be checked in.
</commit_message>
<xml_diff>
--- a/modules/core/design/project/Project images.pptx
+++ b/modules/core/design/project/Project images.pptx
@@ -6,6 +6,7 @@
   </p:sldMasterIdLst>
   <p:sldIdLst>
     <p:sldId id="257" r:id="rId2"/>
+    <p:sldId id="258" r:id="rId3"/>
   </p:sldIdLst>
   <p:sldSz cx="9144000" cy="6858000" type="screen4x3"/>
   <p:notesSz cx="6858000" cy="9144000"/>
@@ -288,7 +289,8 @@
           <a:p>
             <a:fld id="{74CD4D2F-3F67-4186-ADEA-E0E7C9CEFA34}" type="datetimeFigureOut">
               <a:rPr lang="en-NZ" smtClean="0"/>
-              <a:t>16/08/2010</a:t>
+              <a:pPr/>
+              <a:t>22/08/2010</a:t>
             </a:fld>
             <a:endParaRPr lang="en-NZ"/>
           </a:p>
@@ -330,6 +332,7 @@
           <a:p>
             <a:fld id="{09A481FE-1F9F-4F67-B027-25EC93F615EB}" type="slidenum">
               <a:rPr lang="en-NZ" smtClean="0"/>
+              <a:pPr/>
               <a:t>‹#›</a:t>
             </a:fld>
             <a:endParaRPr lang="en-NZ"/>
@@ -453,7 +456,8 @@
           <a:p>
             <a:fld id="{74CD4D2F-3F67-4186-ADEA-E0E7C9CEFA34}" type="datetimeFigureOut">
               <a:rPr lang="en-NZ" smtClean="0"/>
-              <a:t>16/08/2010</a:t>
+              <a:pPr/>
+              <a:t>22/08/2010</a:t>
             </a:fld>
             <a:endParaRPr lang="en-NZ"/>
           </a:p>
@@ -495,6 +499,7 @@
           <a:p>
             <a:fld id="{09A481FE-1F9F-4F67-B027-25EC93F615EB}" type="slidenum">
               <a:rPr lang="en-NZ" smtClean="0"/>
+              <a:pPr/>
               <a:t>‹#›</a:t>
             </a:fld>
             <a:endParaRPr lang="en-NZ"/>
@@ -628,7 +633,8 @@
           <a:p>
             <a:fld id="{74CD4D2F-3F67-4186-ADEA-E0E7C9CEFA34}" type="datetimeFigureOut">
               <a:rPr lang="en-NZ" smtClean="0"/>
-              <a:t>16/08/2010</a:t>
+              <a:pPr/>
+              <a:t>22/08/2010</a:t>
             </a:fld>
             <a:endParaRPr lang="en-NZ"/>
           </a:p>
@@ -670,6 +676,7 @@
           <a:p>
             <a:fld id="{09A481FE-1F9F-4F67-B027-25EC93F615EB}" type="slidenum">
               <a:rPr lang="en-NZ" smtClean="0"/>
+              <a:pPr/>
               <a:t>‹#›</a:t>
             </a:fld>
             <a:endParaRPr lang="en-NZ"/>
@@ -793,7 +800,8 @@
           <a:p>
             <a:fld id="{74CD4D2F-3F67-4186-ADEA-E0E7C9CEFA34}" type="datetimeFigureOut">
               <a:rPr lang="en-NZ" smtClean="0"/>
-              <a:t>16/08/2010</a:t>
+              <a:pPr/>
+              <a:t>22/08/2010</a:t>
             </a:fld>
             <a:endParaRPr lang="en-NZ"/>
           </a:p>
@@ -835,6 +843,7 @@
           <a:p>
             <a:fld id="{09A481FE-1F9F-4F67-B027-25EC93F615EB}" type="slidenum">
               <a:rPr lang="en-NZ" smtClean="0"/>
+              <a:pPr/>
               <a:t>‹#›</a:t>
             </a:fld>
             <a:endParaRPr lang="en-NZ"/>
@@ -1034,7 +1043,8 @@
           <a:p>
             <a:fld id="{74CD4D2F-3F67-4186-ADEA-E0E7C9CEFA34}" type="datetimeFigureOut">
               <a:rPr lang="en-NZ" smtClean="0"/>
-              <a:t>16/08/2010</a:t>
+              <a:pPr/>
+              <a:t>22/08/2010</a:t>
             </a:fld>
             <a:endParaRPr lang="en-NZ"/>
           </a:p>
@@ -1076,6 +1086,7 @@
           <a:p>
             <a:fld id="{09A481FE-1F9F-4F67-B027-25EC93F615EB}" type="slidenum">
               <a:rPr lang="en-NZ" smtClean="0"/>
+              <a:pPr/>
               <a:t>‹#›</a:t>
             </a:fld>
             <a:endParaRPr lang="en-NZ"/>
@@ -1317,7 +1328,8 @@
           <a:p>
             <a:fld id="{74CD4D2F-3F67-4186-ADEA-E0E7C9CEFA34}" type="datetimeFigureOut">
               <a:rPr lang="en-NZ" smtClean="0"/>
-              <a:t>16/08/2010</a:t>
+              <a:pPr/>
+              <a:t>22/08/2010</a:t>
             </a:fld>
             <a:endParaRPr lang="en-NZ"/>
           </a:p>
@@ -1359,6 +1371,7 @@
           <a:p>
             <a:fld id="{09A481FE-1F9F-4F67-B027-25EC93F615EB}" type="slidenum">
               <a:rPr lang="en-NZ" smtClean="0"/>
+              <a:pPr/>
               <a:t>‹#›</a:t>
             </a:fld>
             <a:endParaRPr lang="en-NZ"/>
@@ -1734,7 +1747,8 @@
           <a:p>
             <a:fld id="{74CD4D2F-3F67-4186-ADEA-E0E7C9CEFA34}" type="datetimeFigureOut">
               <a:rPr lang="en-NZ" smtClean="0"/>
-              <a:t>16/08/2010</a:t>
+              <a:pPr/>
+              <a:t>22/08/2010</a:t>
             </a:fld>
             <a:endParaRPr lang="en-NZ"/>
           </a:p>
@@ -1776,6 +1790,7 @@
           <a:p>
             <a:fld id="{09A481FE-1F9F-4F67-B027-25EC93F615EB}" type="slidenum">
               <a:rPr lang="en-NZ" smtClean="0"/>
+              <a:pPr/>
               <a:t>‹#›</a:t>
             </a:fld>
             <a:endParaRPr lang="en-NZ"/>
@@ -1847,7 +1862,8 @@
           <a:p>
             <a:fld id="{74CD4D2F-3F67-4186-ADEA-E0E7C9CEFA34}" type="datetimeFigureOut">
               <a:rPr lang="en-NZ" smtClean="0"/>
-              <a:t>16/08/2010</a:t>
+              <a:pPr/>
+              <a:t>22/08/2010</a:t>
             </a:fld>
             <a:endParaRPr lang="en-NZ"/>
           </a:p>
@@ -1889,6 +1905,7 @@
           <a:p>
             <a:fld id="{09A481FE-1F9F-4F67-B027-25EC93F615EB}" type="slidenum">
               <a:rPr lang="en-NZ" smtClean="0"/>
+              <a:pPr/>
               <a:t>‹#›</a:t>
             </a:fld>
             <a:endParaRPr lang="en-NZ"/>
@@ -1937,7 +1954,8 @@
           <a:p>
             <a:fld id="{74CD4D2F-3F67-4186-ADEA-E0E7C9CEFA34}" type="datetimeFigureOut">
               <a:rPr lang="en-NZ" smtClean="0"/>
-              <a:t>16/08/2010</a:t>
+              <a:pPr/>
+              <a:t>22/08/2010</a:t>
             </a:fld>
             <a:endParaRPr lang="en-NZ"/>
           </a:p>
@@ -1979,6 +1997,7 @@
           <a:p>
             <a:fld id="{09A481FE-1F9F-4F67-B027-25EC93F615EB}" type="slidenum">
               <a:rPr lang="en-NZ" smtClean="0"/>
+              <a:pPr/>
               <a:t>‹#›</a:t>
             </a:fld>
             <a:endParaRPr lang="en-NZ"/>
@@ -2209,7 +2228,8 @@
           <a:p>
             <a:fld id="{74CD4D2F-3F67-4186-ADEA-E0E7C9CEFA34}" type="datetimeFigureOut">
               <a:rPr lang="en-NZ" smtClean="0"/>
-              <a:t>16/08/2010</a:t>
+              <a:pPr/>
+              <a:t>22/08/2010</a:t>
             </a:fld>
             <a:endParaRPr lang="en-NZ"/>
           </a:p>
@@ -2251,6 +2271,7 @@
           <a:p>
             <a:fld id="{09A481FE-1F9F-4F67-B027-25EC93F615EB}" type="slidenum">
               <a:rPr lang="en-NZ" smtClean="0"/>
+              <a:pPr/>
               <a:t>‹#›</a:t>
             </a:fld>
             <a:endParaRPr lang="en-NZ"/>
@@ -2457,7 +2478,8 @@
           <a:p>
             <a:fld id="{74CD4D2F-3F67-4186-ADEA-E0E7C9CEFA34}" type="datetimeFigureOut">
               <a:rPr lang="en-NZ" smtClean="0"/>
-              <a:t>16/08/2010</a:t>
+              <a:pPr/>
+              <a:t>22/08/2010</a:t>
             </a:fld>
             <a:endParaRPr lang="en-NZ"/>
           </a:p>
@@ -2499,6 +2521,7 @@
           <a:p>
             <a:fld id="{09A481FE-1F9F-4F67-B027-25EC93F615EB}" type="slidenum">
               <a:rPr lang="en-NZ" smtClean="0"/>
+              <a:pPr/>
               <a:t>‹#›</a:t>
             </a:fld>
             <a:endParaRPr lang="en-NZ"/>
@@ -2665,7 +2688,8 @@
           <a:p>
             <a:fld id="{74CD4D2F-3F67-4186-ADEA-E0E7C9CEFA34}" type="datetimeFigureOut">
               <a:rPr lang="en-NZ" smtClean="0"/>
-              <a:t>16/08/2010</a:t>
+              <a:pPr/>
+              <a:t>22/08/2010</a:t>
             </a:fld>
             <a:endParaRPr lang="en-NZ"/>
           </a:p>
@@ -2743,6 +2767,7 @@
           <a:p>
             <a:fld id="{09A481FE-1F9F-4F67-B027-25EC93F615EB}" type="slidenum">
               <a:rPr lang="en-NZ" smtClean="0"/>
+              <a:pPr/>
               <a:t>‹#›</a:t>
             </a:fld>
             <a:endParaRPr lang="en-NZ"/>
@@ -3552,6 +3577,1452 @@
           <a:p>
             <a:pPr algn="ctr"/>
             <a:endParaRPr lang="en-NZ"/>
+          </a:p>
+        </p:txBody>
+      </p:sp>
+    </p:spTree>
+  </p:cSld>
+  <p:clrMapOvr>
+    <a:masterClrMapping/>
+  </p:clrMapOvr>
+</p:sld>
+</file>
+
+<file path=ppt/slides/slide2.xml><?xml version="1.0" encoding="utf-8"?>
+<p:sld xmlns:a="http://schemas.openxmlformats.org/drawingml/2006/main" xmlns:r="http://schemas.openxmlformats.org/officeDocument/2006/relationships" xmlns:p="http://schemas.openxmlformats.org/presentationml/2006/main">
+  <p:cSld>
+    <p:spTree>
+      <p:nvGrpSpPr>
+        <p:cNvPr id="1" name=""/>
+        <p:cNvGrpSpPr/>
+        <p:nvPr/>
+      </p:nvGrpSpPr>
+      <p:grpSpPr>
+        <a:xfrm>
+          <a:off x="0" y="0"/>
+          <a:ext cx="0" cy="0"/>
+          <a:chOff x="0" y="0"/>
+          <a:chExt cx="0" cy="0"/>
+        </a:xfrm>
+      </p:grpSpPr>
+      <p:sp>
+        <p:nvSpPr>
+          <p:cNvPr id="8" name="Rectangle 7"/>
+          <p:cNvSpPr/>
+          <p:nvPr/>
+        </p:nvSpPr>
+        <p:spPr>
+          <a:xfrm>
+            <a:off x="1331640" y="2708920"/>
+            <a:ext cx="1440160" cy="1440160"/>
+          </a:xfrm>
+          <a:prstGeom prst="rect">
+            <a:avLst/>
+          </a:prstGeom>
+          <a:noFill/>
+          <a:ln>
+            <a:solidFill>
+              <a:schemeClr val="tx1"/>
+            </a:solidFill>
+          </a:ln>
+        </p:spPr>
+        <p:style>
+          <a:lnRef idx="2">
+            <a:schemeClr val="accent1">
+              <a:shade val="50000"/>
+            </a:schemeClr>
+          </a:lnRef>
+          <a:fillRef idx="1">
+            <a:schemeClr val="accent1"/>
+          </a:fillRef>
+          <a:effectRef idx="0">
+            <a:schemeClr val="accent1"/>
+          </a:effectRef>
+          <a:fontRef idx="minor">
+            <a:schemeClr val="lt1"/>
+          </a:fontRef>
+        </p:style>
+        <p:txBody>
+          <a:bodyPr rtlCol="0" anchor="ctr"/>
+          <a:lstStyle/>
+          <a:p>
+            <a:pPr algn="ctr"/>
+            <a:r>
+              <a:rPr lang="en-NZ" dirty="0" smtClean="0">
+                <a:ln>
+                  <a:solidFill>
+                    <a:schemeClr val="tx1"/>
+                  </a:solidFill>
+                </a:ln>
+                <a:solidFill>
+                  <a:schemeClr val="tx1"/>
+                </a:solidFill>
+              </a:rPr>
+              <a:t>Parent Dataset 1</a:t>
+            </a:r>
+            <a:endParaRPr lang="en-NZ" dirty="0">
+              <a:ln>
+                <a:solidFill>
+                  <a:schemeClr val="tx1"/>
+                </a:solidFill>
+              </a:ln>
+              <a:solidFill>
+                <a:schemeClr val="tx1"/>
+              </a:solidFill>
+            </a:endParaRPr>
+          </a:p>
+        </p:txBody>
+      </p:sp>
+      <p:sp>
+        <p:nvSpPr>
+          <p:cNvPr id="14" name="Rectangle 13"/>
+          <p:cNvSpPr/>
+          <p:nvPr/>
+        </p:nvSpPr>
+        <p:spPr>
+          <a:xfrm>
+            <a:off x="251520" y="4869160"/>
+            <a:ext cx="1440160" cy="1440160"/>
+          </a:xfrm>
+          <a:prstGeom prst="rect">
+            <a:avLst/>
+          </a:prstGeom>
+          <a:noFill/>
+          <a:ln>
+            <a:solidFill>
+              <a:schemeClr val="tx1"/>
+            </a:solidFill>
+          </a:ln>
+        </p:spPr>
+        <p:style>
+          <a:lnRef idx="2">
+            <a:schemeClr val="accent1">
+              <a:shade val="50000"/>
+            </a:schemeClr>
+          </a:lnRef>
+          <a:fillRef idx="1">
+            <a:schemeClr val="accent1"/>
+          </a:fillRef>
+          <a:effectRef idx="0">
+            <a:schemeClr val="accent1"/>
+          </a:effectRef>
+          <a:fontRef idx="minor">
+            <a:schemeClr val="lt1"/>
+          </a:fontRef>
+        </p:style>
+        <p:txBody>
+          <a:bodyPr rtlCol="0" anchor="ctr"/>
+          <a:lstStyle/>
+          <a:p>
+            <a:pPr algn="ctr"/>
+            <a:r>
+              <a:rPr lang="en-NZ" dirty="0" smtClean="0">
+                <a:ln>
+                  <a:solidFill>
+                    <a:schemeClr val="tx1"/>
+                  </a:solidFill>
+                </a:ln>
+                <a:solidFill>
+                  <a:schemeClr val="tx1"/>
+                </a:solidFill>
+              </a:rPr>
+              <a:t>Child</a:t>
+            </a:r>
+          </a:p>
+          <a:p>
+            <a:pPr algn="ctr"/>
+            <a:r>
+              <a:rPr lang="en-NZ" dirty="0" smtClean="0">
+                <a:ln>
+                  <a:solidFill>
+                    <a:schemeClr val="tx1"/>
+                  </a:solidFill>
+                </a:ln>
+                <a:solidFill>
+                  <a:schemeClr val="tx1"/>
+                </a:solidFill>
+              </a:rPr>
+              <a:t>Dataset 1</a:t>
+            </a:r>
+            <a:endParaRPr lang="en-NZ" dirty="0">
+              <a:ln>
+                <a:solidFill>
+                  <a:schemeClr val="tx1"/>
+                </a:solidFill>
+              </a:ln>
+              <a:solidFill>
+                <a:schemeClr val="tx1"/>
+              </a:solidFill>
+            </a:endParaRPr>
+          </a:p>
+        </p:txBody>
+      </p:sp>
+      <p:sp>
+        <p:nvSpPr>
+          <p:cNvPr id="15" name="Rectangle 14"/>
+          <p:cNvSpPr/>
+          <p:nvPr/>
+        </p:nvSpPr>
+        <p:spPr>
+          <a:xfrm>
+            <a:off x="2411760" y="4869160"/>
+            <a:ext cx="1440160" cy="1440160"/>
+          </a:xfrm>
+          <a:prstGeom prst="rect">
+            <a:avLst/>
+          </a:prstGeom>
+          <a:noFill/>
+          <a:ln>
+            <a:solidFill>
+              <a:schemeClr val="tx1"/>
+            </a:solidFill>
+          </a:ln>
+        </p:spPr>
+        <p:style>
+          <a:lnRef idx="2">
+            <a:schemeClr val="accent1">
+              <a:shade val="50000"/>
+            </a:schemeClr>
+          </a:lnRef>
+          <a:fillRef idx="1">
+            <a:schemeClr val="accent1"/>
+          </a:fillRef>
+          <a:effectRef idx="0">
+            <a:schemeClr val="accent1"/>
+          </a:effectRef>
+          <a:fontRef idx="minor">
+            <a:schemeClr val="lt1"/>
+          </a:fontRef>
+        </p:style>
+        <p:txBody>
+          <a:bodyPr rtlCol="0" anchor="ctr"/>
+          <a:lstStyle/>
+          <a:p>
+            <a:pPr algn="ctr"/>
+            <a:r>
+              <a:rPr lang="en-NZ" dirty="0" smtClean="0">
+                <a:ln>
+                  <a:solidFill>
+                    <a:schemeClr val="tx1"/>
+                  </a:solidFill>
+                </a:ln>
+                <a:solidFill>
+                  <a:schemeClr val="tx1"/>
+                </a:solidFill>
+              </a:rPr>
+              <a:t>Child</a:t>
+            </a:r>
+          </a:p>
+          <a:p>
+            <a:pPr algn="ctr"/>
+            <a:r>
+              <a:rPr lang="en-NZ" dirty="0" smtClean="0">
+                <a:ln>
+                  <a:solidFill>
+                    <a:schemeClr val="tx1"/>
+                  </a:solidFill>
+                </a:ln>
+                <a:solidFill>
+                  <a:schemeClr val="tx1"/>
+                </a:solidFill>
+              </a:rPr>
+              <a:t>Dataset </a:t>
+            </a:r>
+            <a:r>
+              <a:rPr lang="en-NZ" dirty="0" smtClean="0">
+                <a:ln>
+                  <a:solidFill>
+                    <a:schemeClr val="tx1"/>
+                  </a:solidFill>
+                </a:ln>
+                <a:solidFill>
+                  <a:schemeClr val="tx1"/>
+                </a:solidFill>
+              </a:rPr>
+              <a:t>2</a:t>
+            </a:r>
+            <a:endParaRPr lang="en-NZ" dirty="0">
+              <a:ln>
+                <a:solidFill>
+                  <a:schemeClr val="tx1"/>
+                </a:solidFill>
+              </a:ln>
+              <a:solidFill>
+                <a:schemeClr val="tx1"/>
+              </a:solidFill>
+            </a:endParaRPr>
+          </a:p>
+        </p:txBody>
+      </p:sp>
+      <p:sp>
+        <p:nvSpPr>
+          <p:cNvPr id="16" name="Rectangle 15"/>
+          <p:cNvSpPr/>
+          <p:nvPr/>
+        </p:nvSpPr>
+        <p:spPr>
+          <a:xfrm>
+            <a:off x="5292080" y="4869160"/>
+            <a:ext cx="1440160" cy="1440160"/>
+          </a:xfrm>
+          <a:prstGeom prst="rect">
+            <a:avLst/>
+          </a:prstGeom>
+          <a:noFill/>
+          <a:ln>
+            <a:solidFill>
+              <a:schemeClr val="tx1"/>
+            </a:solidFill>
+          </a:ln>
+        </p:spPr>
+        <p:style>
+          <a:lnRef idx="2">
+            <a:schemeClr val="accent1">
+              <a:shade val="50000"/>
+            </a:schemeClr>
+          </a:lnRef>
+          <a:fillRef idx="1">
+            <a:schemeClr val="accent1"/>
+          </a:fillRef>
+          <a:effectRef idx="0">
+            <a:schemeClr val="accent1"/>
+          </a:effectRef>
+          <a:fontRef idx="minor">
+            <a:schemeClr val="lt1"/>
+          </a:fontRef>
+        </p:style>
+        <p:txBody>
+          <a:bodyPr rtlCol="0" anchor="ctr"/>
+          <a:lstStyle/>
+          <a:p>
+            <a:pPr algn="ctr"/>
+            <a:r>
+              <a:rPr lang="en-NZ" dirty="0" smtClean="0">
+                <a:ln>
+                  <a:solidFill>
+                    <a:schemeClr val="tx1"/>
+                  </a:solidFill>
+                </a:ln>
+                <a:solidFill>
+                  <a:schemeClr val="tx1"/>
+                </a:solidFill>
+              </a:rPr>
+              <a:t>Child</a:t>
+            </a:r>
+          </a:p>
+          <a:p>
+            <a:pPr algn="ctr"/>
+            <a:r>
+              <a:rPr lang="en-NZ" dirty="0" smtClean="0">
+                <a:ln>
+                  <a:solidFill>
+                    <a:schemeClr val="tx1"/>
+                  </a:solidFill>
+                </a:ln>
+                <a:solidFill>
+                  <a:schemeClr val="tx1"/>
+                </a:solidFill>
+              </a:rPr>
+              <a:t> Dataset 3</a:t>
+            </a:r>
+            <a:endParaRPr lang="en-NZ" dirty="0">
+              <a:ln>
+                <a:solidFill>
+                  <a:schemeClr val="tx1"/>
+                </a:solidFill>
+              </a:ln>
+              <a:solidFill>
+                <a:schemeClr val="tx1"/>
+              </a:solidFill>
+            </a:endParaRPr>
+          </a:p>
+        </p:txBody>
+      </p:sp>
+      <p:sp>
+        <p:nvSpPr>
+          <p:cNvPr id="17" name="Rectangle 16"/>
+          <p:cNvSpPr/>
+          <p:nvPr/>
+        </p:nvSpPr>
+        <p:spPr>
+          <a:xfrm>
+            <a:off x="7452320" y="4869160"/>
+            <a:ext cx="1440160" cy="1440160"/>
+          </a:xfrm>
+          <a:prstGeom prst="rect">
+            <a:avLst/>
+          </a:prstGeom>
+          <a:noFill/>
+          <a:ln>
+            <a:solidFill>
+              <a:schemeClr val="tx1"/>
+            </a:solidFill>
+          </a:ln>
+        </p:spPr>
+        <p:style>
+          <a:lnRef idx="2">
+            <a:schemeClr val="accent1">
+              <a:shade val="50000"/>
+            </a:schemeClr>
+          </a:lnRef>
+          <a:fillRef idx="1">
+            <a:schemeClr val="accent1"/>
+          </a:fillRef>
+          <a:effectRef idx="0">
+            <a:schemeClr val="accent1"/>
+          </a:effectRef>
+          <a:fontRef idx="minor">
+            <a:schemeClr val="lt1"/>
+          </a:fontRef>
+        </p:style>
+        <p:txBody>
+          <a:bodyPr rtlCol="0" anchor="ctr"/>
+          <a:lstStyle/>
+          <a:p>
+            <a:pPr algn="ctr"/>
+            <a:r>
+              <a:rPr lang="en-NZ" dirty="0" smtClean="0">
+                <a:ln>
+                  <a:solidFill>
+                    <a:schemeClr val="tx1"/>
+                  </a:solidFill>
+                </a:ln>
+                <a:solidFill>
+                  <a:schemeClr val="tx1"/>
+                </a:solidFill>
+              </a:rPr>
+              <a:t>Child</a:t>
+            </a:r>
+          </a:p>
+          <a:p>
+            <a:pPr algn="ctr"/>
+            <a:r>
+              <a:rPr lang="en-NZ" dirty="0" smtClean="0">
+                <a:ln>
+                  <a:solidFill>
+                    <a:schemeClr val="tx1"/>
+                  </a:solidFill>
+                </a:ln>
+                <a:solidFill>
+                  <a:schemeClr val="tx1"/>
+                </a:solidFill>
+              </a:rPr>
+              <a:t>Dataset </a:t>
+            </a:r>
+            <a:r>
+              <a:rPr lang="en-NZ" dirty="0" smtClean="0">
+                <a:ln>
+                  <a:solidFill>
+                    <a:schemeClr val="tx1"/>
+                  </a:solidFill>
+                </a:ln>
+                <a:solidFill>
+                  <a:schemeClr val="tx1"/>
+                </a:solidFill>
+              </a:rPr>
+              <a:t>4</a:t>
+            </a:r>
+            <a:endParaRPr lang="en-NZ" dirty="0">
+              <a:ln>
+                <a:solidFill>
+                  <a:schemeClr val="tx1"/>
+                </a:solidFill>
+              </a:ln>
+              <a:solidFill>
+                <a:schemeClr val="tx1"/>
+              </a:solidFill>
+            </a:endParaRPr>
+          </a:p>
+        </p:txBody>
+      </p:sp>
+      <p:sp>
+        <p:nvSpPr>
+          <p:cNvPr id="18" name="Rectangle 17"/>
+          <p:cNvSpPr/>
+          <p:nvPr/>
+        </p:nvSpPr>
+        <p:spPr>
+          <a:xfrm>
+            <a:off x="6372200" y="2708920"/>
+            <a:ext cx="1440160" cy="1440160"/>
+          </a:xfrm>
+          <a:prstGeom prst="rect">
+            <a:avLst/>
+          </a:prstGeom>
+          <a:noFill/>
+          <a:ln>
+            <a:solidFill>
+              <a:schemeClr val="tx1"/>
+            </a:solidFill>
+          </a:ln>
+        </p:spPr>
+        <p:style>
+          <a:lnRef idx="2">
+            <a:schemeClr val="accent1">
+              <a:shade val="50000"/>
+            </a:schemeClr>
+          </a:lnRef>
+          <a:fillRef idx="1">
+            <a:schemeClr val="accent1"/>
+          </a:fillRef>
+          <a:effectRef idx="0">
+            <a:schemeClr val="accent1"/>
+          </a:effectRef>
+          <a:fontRef idx="minor">
+            <a:schemeClr val="lt1"/>
+          </a:fontRef>
+        </p:style>
+        <p:txBody>
+          <a:bodyPr rtlCol="0" anchor="ctr"/>
+          <a:lstStyle/>
+          <a:p>
+            <a:pPr algn="ctr"/>
+            <a:r>
+              <a:rPr lang="en-NZ" dirty="0" smtClean="0">
+                <a:ln>
+                  <a:solidFill>
+                    <a:schemeClr val="tx1"/>
+                  </a:solidFill>
+                </a:ln>
+                <a:solidFill>
+                  <a:schemeClr val="tx1"/>
+                </a:solidFill>
+              </a:rPr>
+              <a:t>Parent Dataset 2</a:t>
+            </a:r>
+            <a:endParaRPr lang="en-NZ" dirty="0">
+              <a:ln>
+                <a:solidFill>
+                  <a:schemeClr val="tx1"/>
+                </a:solidFill>
+              </a:ln>
+              <a:solidFill>
+                <a:schemeClr val="tx1"/>
+              </a:solidFill>
+            </a:endParaRPr>
+          </a:p>
+        </p:txBody>
+      </p:sp>
+      <p:sp>
+        <p:nvSpPr>
+          <p:cNvPr id="19" name="Rectangle 18"/>
+          <p:cNvSpPr/>
+          <p:nvPr/>
+        </p:nvSpPr>
+        <p:spPr>
+          <a:xfrm>
+            <a:off x="6372200" y="404664"/>
+            <a:ext cx="1440160" cy="1440160"/>
+          </a:xfrm>
+          <a:prstGeom prst="rect">
+            <a:avLst/>
+          </a:prstGeom>
+          <a:noFill/>
+          <a:ln>
+            <a:solidFill>
+              <a:schemeClr val="tx1"/>
+            </a:solidFill>
+          </a:ln>
+        </p:spPr>
+        <p:style>
+          <a:lnRef idx="2">
+            <a:schemeClr val="accent1">
+              <a:shade val="50000"/>
+            </a:schemeClr>
+          </a:lnRef>
+          <a:fillRef idx="1">
+            <a:schemeClr val="accent1"/>
+          </a:fillRef>
+          <a:effectRef idx="0">
+            <a:schemeClr val="accent1"/>
+          </a:effectRef>
+          <a:fontRef idx="minor">
+            <a:schemeClr val="lt1"/>
+          </a:fontRef>
+        </p:style>
+        <p:txBody>
+          <a:bodyPr rtlCol="0" anchor="ctr"/>
+          <a:lstStyle/>
+          <a:p>
+            <a:pPr algn="ctr"/>
+            <a:r>
+              <a:rPr lang="en-NZ" dirty="0" smtClean="0">
+                <a:ln>
+                  <a:solidFill>
+                    <a:schemeClr val="tx1"/>
+                  </a:solidFill>
+                </a:ln>
+                <a:solidFill>
+                  <a:schemeClr val="tx1"/>
+                </a:solidFill>
+              </a:rPr>
+              <a:t>Apollo service</a:t>
+            </a:r>
+            <a:endParaRPr lang="en-NZ" dirty="0">
+              <a:ln>
+                <a:solidFill>
+                  <a:schemeClr val="tx1"/>
+                </a:solidFill>
+              </a:ln>
+              <a:solidFill>
+                <a:schemeClr val="tx1"/>
+              </a:solidFill>
+            </a:endParaRPr>
+          </a:p>
+        </p:txBody>
+      </p:sp>
+      <p:sp>
+        <p:nvSpPr>
+          <p:cNvPr id="20" name="Rectangle 19"/>
+          <p:cNvSpPr/>
+          <p:nvPr/>
+        </p:nvSpPr>
+        <p:spPr>
+          <a:xfrm>
+            <a:off x="1331640" y="404664"/>
+            <a:ext cx="1440160" cy="1440160"/>
+          </a:xfrm>
+          <a:prstGeom prst="rect">
+            <a:avLst/>
+          </a:prstGeom>
+          <a:noFill/>
+          <a:ln>
+            <a:solidFill>
+              <a:schemeClr val="tx1"/>
+            </a:solidFill>
+          </a:ln>
+        </p:spPr>
+        <p:style>
+          <a:lnRef idx="2">
+            <a:schemeClr val="accent1">
+              <a:shade val="50000"/>
+            </a:schemeClr>
+          </a:lnRef>
+          <a:fillRef idx="1">
+            <a:schemeClr val="accent1"/>
+          </a:fillRef>
+          <a:effectRef idx="0">
+            <a:schemeClr val="accent1"/>
+          </a:effectRef>
+          <a:fontRef idx="minor">
+            <a:schemeClr val="lt1"/>
+          </a:fontRef>
+        </p:style>
+        <p:txBody>
+          <a:bodyPr rtlCol="0" anchor="ctr"/>
+          <a:lstStyle/>
+          <a:p>
+            <a:pPr algn="ctr"/>
+            <a:r>
+              <a:rPr lang="en-NZ" dirty="0" smtClean="0">
+                <a:ln>
+                  <a:solidFill>
+                    <a:schemeClr val="tx1"/>
+                  </a:solidFill>
+                </a:ln>
+                <a:solidFill>
+                  <a:schemeClr val="tx1"/>
+                </a:solidFill>
+              </a:rPr>
+              <a:t>Apollo application</a:t>
+            </a:r>
+            <a:endParaRPr lang="en-NZ" dirty="0">
+              <a:ln>
+                <a:solidFill>
+                  <a:schemeClr val="tx1"/>
+                </a:solidFill>
+              </a:ln>
+              <a:solidFill>
+                <a:schemeClr val="tx1"/>
+              </a:solidFill>
+            </a:endParaRPr>
+          </a:p>
+        </p:txBody>
+      </p:sp>
+      <p:sp>
+        <p:nvSpPr>
+          <p:cNvPr id="22" name="Rectangle 21"/>
+          <p:cNvSpPr/>
+          <p:nvPr/>
+        </p:nvSpPr>
+        <p:spPr>
+          <a:xfrm>
+            <a:off x="5148064" y="260648"/>
+            <a:ext cx="3888432" cy="6192688"/>
+          </a:xfrm>
+          <a:prstGeom prst="rect">
+            <a:avLst/>
+          </a:prstGeom>
+          <a:noFill/>
+          <a:ln>
+            <a:solidFill>
+              <a:schemeClr val="accent2"/>
+            </a:solidFill>
+          </a:ln>
+        </p:spPr>
+        <p:style>
+          <a:lnRef idx="2">
+            <a:schemeClr val="accent1">
+              <a:shade val="50000"/>
+            </a:schemeClr>
+          </a:lnRef>
+          <a:fillRef idx="1">
+            <a:schemeClr val="accent1"/>
+          </a:fillRef>
+          <a:effectRef idx="0">
+            <a:schemeClr val="accent1"/>
+          </a:effectRef>
+          <a:fontRef idx="minor">
+            <a:schemeClr val="lt1"/>
+          </a:fontRef>
+        </p:style>
+        <p:txBody>
+          <a:bodyPr vert="vert270" rtlCol="0" anchor="t" anchorCtr="1"/>
+          <a:lstStyle/>
+          <a:p>
+            <a:pPr algn="ctr"/>
+            <a:r>
+              <a:rPr lang="en-NZ" dirty="0" smtClean="0">
+                <a:ln>
+                  <a:solidFill>
+                    <a:schemeClr val="accent2"/>
+                  </a:solidFill>
+                </a:ln>
+                <a:solidFill>
+                  <a:schemeClr val="accent2"/>
+                </a:solidFill>
+              </a:rPr>
+              <a:t>Remote server</a:t>
+            </a:r>
+            <a:endParaRPr lang="en-NZ" dirty="0">
+              <a:ln>
+                <a:solidFill>
+                  <a:schemeClr val="accent2"/>
+                </a:solidFill>
+              </a:ln>
+              <a:solidFill>
+                <a:schemeClr val="accent2"/>
+              </a:solidFill>
+            </a:endParaRPr>
+          </a:p>
+        </p:txBody>
+      </p:sp>
+      <p:sp>
+        <p:nvSpPr>
+          <p:cNvPr id="23" name="Rectangle 22"/>
+          <p:cNvSpPr/>
+          <p:nvPr/>
+        </p:nvSpPr>
+        <p:spPr>
+          <a:xfrm>
+            <a:off x="107504" y="260648"/>
+            <a:ext cx="3888432" cy="6192688"/>
+          </a:xfrm>
+          <a:prstGeom prst="rect">
+            <a:avLst/>
+          </a:prstGeom>
+          <a:noFill/>
+          <a:ln>
+            <a:solidFill>
+              <a:schemeClr val="accent2"/>
+            </a:solidFill>
+          </a:ln>
+        </p:spPr>
+        <p:style>
+          <a:lnRef idx="2">
+            <a:schemeClr val="accent1">
+              <a:shade val="50000"/>
+            </a:schemeClr>
+          </a:lnRef>
+          <a:fillRef idx="1">
+            <a:schemeClr val="accent1"/>
+          </a:fillRef>
+          <a:effectRef idx="0">
+            <a:schemeClr val="accent1"/>
+          </a:effectRef>
+          <a:fontRef idx="minor">
+            <a:schemeClr val="lt1"/>
+          </a:fontRef>
+        </p:style>
+        <p:txBody>
+          <a:bodyPr vert="vert270" rtlCol="0" anchor="t" anchorCtr="1"/>
+          <a:lstStyle/>
+          <a:p>
+            <a:pPr algn="ctr"/>
+            <a:r>
+              <a:rPr lang="en-NZ" dirty="0" smtClean="0">
+                <a:ln>
+                  <a:solidFill>
+                    <a:schemeClr val="accent2"/>
+                  </a:solidFill>
+                </a:ln>
+                <a:solidFill>
+                  <a:schemeClr val="accent2"/>
+                </a:solidFill>
+              </a:rPr>
+              <a:t>Local machine</a:t>
+            </a:r>
+            <a:endParaRPr lang="en-NZ" dirty="0">
+              <a:ln>
+                <a:solidFill>
+                  <a:schemeClr val="accent2"/>
+                </a:solidFill>
+              </a:ln>
+              <a:solidFill>
+                <a:schemeClr val="accent2"/>
+              </a:solidFill>
+            </a:endParaRPr>
+          </a:p>
+        </p:txBody>
+      </p:sp>
+      <p:cxnSp>
+        <p:nvCxnSpPr>
+          <p:cNvPr id="25" name="Elbow Connector 24"/>
+          <p:cNvCxnSpPr>
+            <a:stCxn id="20" idx="2"/>
+            <a:endCxn id="8" idx="0"/>
+          </p:cNvCxnSpPr>
+          <p:nvPr/>
+        </p:nvCxnSpPr>
+        <p:spPr>
+          <a:xfrm rot="5400000">
+            <a:off x="1619672" y="2276872"/>
+            <a:ext cx="864096" cy="1588"/>
+          </a:xfrm>
+          <a:prstGeom prst="bentConnector3">
+            <a:avLst>
+              <a:gd name="adj1" fmla="val 50000"/>
+            </a:avLst>
+          </a:prstGeom>
+          <a:ln w="38100">
+            <a:headEnd type="arrow"/>
+            <a:tailEnd type="arrow"/>
+          </a:ln>
+        </p:spPr>
+        <p:style>
+          <a:lnRef idx="1">
+            <a:schemeClr val="accent1"/>
+          </a:lnRef>
+          <a:fillRef idx="0">
+            <a:schemeClr val="accent1"/>
+          </a:fillRef>
+          <a:effectRef idx="0">
+            <a:schemeClr val="accent1"/>
+          </a:effectRef>
+          <a:fontRef idx="minor">
+            <a:schemeClr val="tx1"/>
+          </a:fontRef>
+        </p:style>
+      </p:cxnSp>
+      <p:cxnSp>
+        <p:nvCxnSpPr>
+          <p:cNvPr id="27" name="Shape 26"/>
+          <p:cNvCxnSpPr>
+            <a:stCxn id="8" idx="1"/>
+            <a:endCxn id="14" idx="0"/>
+          </p:cNvCxnSpPr>
+          <p:nvPr/>
+        </p:nvCxnSpPr>
+        <p:spPr>
+          <a:xfrm rot="10800000" flipV="1">
+            <a:off x="971600" y="3429000"/>
+            <a:ext cx="360040" cy="1440160"/>
+          </a:xfrm>
+          <a:prstGeom prst="bentConnector2">
+            <a:avLst/>
+          </a:prstGeom>
+          <a:ln w="38100">
+            <a:headEnd type="arrow"/>
+            <a:tailEnd type="arrow"/>
+          </a:ln>
+        </p:spPr>
+        <p:style>
+          <a:lnRef idx="1">
+            <a:schemeClr val="accent1"/>
+          </a:lnRef>
+          <a:fillRef idx="0">
+            <a:schemeClr val="accent1"/>
+          </a:fillRef>
+          <a:effectRef idx="0">
+            <a:schemeClr val="accent1"/>
+          </a:effectRef>
+          <a:fontRef idx="minor">
+            <a:schemeClr val="tx1"/>
+          </a:fontRef>
+        </p:style>
+      </p:cxnSp>
+      <p:cxnSp>
+        <p:nvCxnSpPr>
+          <p:cNvPr id="29" name="Shape 28"/>
+          <p:cNvCxnSpPr>
+            <a:stCxn id="8" idx="3"/>
+            <a:endCxn id="15" idx="0"/>
+          </p:cNvCxnSpPr>
+          <p:nvPr/>
+        </p:nvCxnSpPr>
+        <p:spPr>
+          <a:xfrm>
+            <a:off x="2771800" y="3429000"/>
+            <a:ext cx="360040" cy="1440160"/>
+          </a:xfrm>
+          <a:prstGeom prst="bentConnector2">
+            <a:avLst/>
+          </a:prstGeom>
+          <a:ln w="38100">
+            <a:headEnd type="arrow"/>
+            <a:tailEnd type="arrow"/>
+          </a:ln>
+        </p:spPr>
+        <p:style>
+          <a:lnRef idx="1">
+            <a:schemeClr val="accent1"/>
+          </a:lnRef>
+          <a:fillRef idx="0">
+            <a:schemeClr val="accent1"/>
+          </a:fillRef>
+          <a:effectRef idx="0">
+            <a:schemeClr val="accent1"/>
+          </a:effectRef>
+          <a:fontRef idx="minor">
+            <a:schemeClr val="tx1"/>
+          </a:fontRef>
+        </p:style>
+      </p:cxnSp>
+      <p:cxnSp>
+        <p:nvCxnSpPr>
+          <p:cNvPr id="31" name="Elbow Connector 30"/>
+          <p:cNvCxnSpPr>
+            <a:stCxn id="20" idx="3"/>
+            <a:endCxn id="19" idx="1"/>
+          </p:cNvCxnSpPr>
+          <p:nvPr/>
+        </p:nvCxnSpPr>
+        <p:spPr>
+          <a:xfrm>
+            <a:off x="2771800" y="1124744"/>
+            <a:ext cx="3600400" cy="1588"/>
+          </a:xfrm>
+          <a:prstGeom prst="bentConnector3">
+            <a:avLst>
+              <a:gd name="adj1" fmla="val 50000"/>
+            </a:avLst>
+          </a:prstGeom>
+          <a:ln w="38100">
+            <a:solidFill>
+              <a:schemeClr val="accent4"/>
+            </a:solidFill>
+            <a:headEnd type="arrow"/>
+            <a:tailEnd type="arrow"/>
+          </a:ln>
+        </p:spPr>
+        <p:style>
+          <a:lnRef idx="1">
+            <a:schemeClr val="accent1"/>
+          </a:lnRef>
+          <a:fillRef idx="0">
+            <a:schemeClr val="accent1"/>
+          </a:fillRef>
+          <a:effectRef idx="0">
+            <a:schemeClr val="accent1"/>
+          </a:effectRef>
+          <a:fontRef idx="minor">
+            <a:schemeClr val="tx1"/>
+          </a:fontRef>
+        </p:style>
+      </p:cxnSp>
+      <p:cxnSp>
+        <p:nvCxnSpPr>
+          <p:cNvPr id="33" name="Elbow Connector 32"/>
+          <p:cNvCxnSpPr>
+            <a:stCxn id="19" idx="2"/>
+            <a:endCxn id="18" idx="0"/>
+          </p:cNvCxnSpPr>
+          <p:nvPr/>
+        </p:nvCxnSpPr>
+        <p:spPr>
+          <a:xfrm rot="5400000">
+            <a:off x="6660232" y="2276872"/>
+            <a:ext cx="864096" cy="1588"/>
+          </a:xfrm>
+          <a:prstGeom prst="bentConnector3">
+            <a:avLst>
+              <a:gd name="adj1" fmla="val 50000"/>
+            </a:avLst>
+          </a:prstGeom>
+          <a:ln w="38100">
+            <a:headEnd type="arrow"/>
+            <a:tailEnd type="arrow"/>
+          </a:ln>
+        </p:spPr>
+        <p:style>
+          <a:lnRef idx="1">
+            <a:schemeClr val="accent1"/>
+          </a:lnRef>
+          <a:fillRef idx="0">
+            <a:schemeClr val="accent1"/>
+          </a:fillRef>
+          <a:effectRef idx="0">
+            <a:schemeClr val="accent1"/>
+          </a:effectRef>
+          <a:fontRef idx="minor">
+            <a:schemeClr val="tx1"/>
+          </a:fontRef>
+        </p:style>
+      </p:cxnSp>
+      <p:cxnSp>
+        <p:nvCxnSpPr>
+          <p:cNvPr id="35" name="Shape 34"/>
+          <p:cNvCxnSpPr>
+            <a:stCxn id="18" idx="1"/>
+            <a:endCxn id="16" idx="0"/>
+          </p:cNvCxnSpPr>
+          <p:nvPr/>
+        </p:nvCxnSpPr>
+        <p:spPr>
+          <a:xfrm rot="10800000" flipV="1">
+            <a:off x="6012160" y="3429000"/>
+            <a:ext cx="360040" cy="1440160"/>
+          </a:xfrm>
+          <a:prstGeom prst="bentConnector2">
+            <a:avLst/>
+          </a:prstGeom>
+          <a:ln w="38100">
+            <a:headEnd type="arrow"/>
+            <a:tailEnd type="arrow"/>
+          </a:ln>
+        </p:spPr>
+        <p:style>
+          <a:lnRef idx="1">
+            <a:schemeClr val="accent1"/>
+          </a:lnRef>
+          <a:fillRef idx="0">
+            <a:schemeClr val="accent1"/>
+          </a:fillRef>
+          <a:effectRef idx="0">
+            <a:schemeClr val="accent1"/>
+          </a:effectRef>
+          <a:fontRef idx="minor">
+            <a:schemeClr val="tx1"/>
+          </a:fontRef>
+        </p:style>
+      </p:cxnSp>
+      <p:cxnSp>
+        <p:nvCxnSpPr>
+          <p:cNvPr id="37" name="Shape 36"/>
+          <p:cNvCxnSpPr>
+            <a:stCxn id="18" idx="3"/>
+            <a:endCxn id="17" idx="0"/>
+          </p:cNvCxnSpPr>
+          <p:nvPr/>
+        </p:nvCxnSpPr>
+        <p:spPr>
+          <a:xfrm>
+            <a:off x="7812360" y="3429000"/>
+            <a:ext cx="360040" cy="1440160"/>
+          </a:xfrm>
+          <a:prstGeom prst="bentConnector2">
+            <a:avLst/>
+          </a:prstGeom>
+          <a:ln w="38100">
+            <a:headEnd type="arrow"/>
+            <a:tailEnd type="arrow"/>
+          </a:ln>
+        </p:spPr>
+        <p:style>
+          <a:lnRef idx="1">
+            <a:schemeClr val="accent1"/>
+          </a:lnRef>
+          <a:fillRef idx="0">
+            <a:schemeClr val="accent1"/>
+          </a:fillRef>
+          <a:effectRef idx="0">
+            <a:schemeClr val="accent1"/>
+          </a:effectRef>
+          <a:fontRef idx="minor">
+            <a:schemeClr val="tx1"/>
+          </a:fontRef>
+        </p:style>
+      </p:cxnSp>
+      <p:cxnSp>
+        <p:nvCxnSpPr>
+          <p:cNvPr id="39" name="Elbow Connector 38"/>
+          <p:cNvCxnSpPr>
+            <a:stCxn id="16" idx="3"/>
+            <a:endCxn id="17" idx="1"/>
+          </p:cNvCxnSpPr>
+          <p:nvPr/>
+        </p:nvCxnSpPr>
+        <p:spPr>
+          <a:xfrm>
+            <a:off x="6732240" y="5589240"/>
+            <a:ext cx="720080" cy="1588"/>
+          </a:xfrm>
+          <a:prstGeom prst="bentConnector3">
+            <a:avLst>
+              <a:gd name="adj1" fmla="val 50000"/>
+            </a:avLst>
+          </a:prstGeom>
+          <a:ln w="38100">
+            <a:solidFill>
+              <a:schemeClr val="accent3"/>
+            </a:solidFill>
+            <a:headEnd type="arrow"/>
+            <a:tailEnd type="arrow"/>
+          </a:ln>
+        </p:spPr>
+        <p:style>
+          <a:lnRef idx="1">
+            <a:schemeClr val="accent1"/>
+          </a:lnRef>
+          <a:fillRef idx="0">
+            <a:schemeClr val="accent1"/>
+          </a:fillRef>
+          <a:effectRef idx="0">
+            <a:schemeClr val="accent1"/>
+          </a:effectRef>
+          <a:fontRef idx="minor">
+            <a:schemeClr val="tx1"/>
+          </a:fontRef>
+        </p:style>
+      </p:cxnSp>
+      <p:cxnSp>
+        <p:nvCxnSpPr>
+          <p:cNvPr id="41" name="Elbow Connector 40"/>
+          <p:cNvCxnSpPr>
+            <a:stCxn id="14" idx="3"/>
+            <a:endCxn id="15" idx="1"/>
+          </p:cNvCxnSpPr>
+          <p:nvPr/>
+        </p:nvCxnSpPr>
+        <p:spPr>
+          <a:xfrm>
+            <a:off x="1691680" y="5589240"/>
+            <a:ext cx="720080" cy="1588"/>
+          </a:xfrm>
+          <a:prstGeom prst="bentConnector3">
+            <a:avLst>
+              <a:gd name="adj1" fmla="val 50000"/>
+            </a:avLst>
+          </a:prstGeom>
+          <a:ln w="38100">
+            <a:solidFill>
+              <a:schemeClr val="accent3"/>
+            </a:solidFill>
+            <a:headEnd type="arrow"/>
+            <a:tailEnd type="arrow"/>
+          </a:ln>
+        </p:spPr>
+        <p:style>
+          <a:lnRef idx="1">
+            <a:schemeClr val="accent1"/>
+          </a:lnRef>
+          <a:fillRef idx="0">
+            <a:schemeClr val="accent1"/>
+          </a:fillRef>
+          <a:effectRef idx="0">
+            <a:schemeClr val="accent1"/>
+          </a:effectRef>
+          <a:fontRef idx="minor">
+            <a:schemeClr val="tx1"/>
+          </a:fontRef>
+        </p:style>
+      </p:cxnSp>
+      <p:cxnSp>
+        <p:nvCxnSpPr>
+          <p:cNvPr id="43" name="Elbow Connector 42"/>
+          <p:cNvCxnSpPr>
+            <a:stCxn id="15" idx="2"/>
+            <a:endCxn id="16" idx="2"/>
+          </p:cNvCxnSpPr>
+          <p:nvPr/>
+        </p:nvCxnSpPr>
+        <p:spPr>
+          <a:xfrm rot="16200000" flipH="1">
+            <a:off x="4572000" y="4869160"/>
+            <a:ext cx="1588" cy="2880320"/>
+          </a:xfrm>
+          <a:prstGeom prst="bentConnector3">
+            <a:avLst>
+              <a:gd name="adj1" fmla="val 14395466"/>
+            </a:avLst>
+          </a:prstGeom>
+          <a:ln w="38100">
+            <a:solidFill>
+              <a:schemeClr val="accent3"/>
+            </a:solidFill>
+            <a:headEnd type="arrow"/>
+            <a:tailEnd type="arrow"/>
+          </a:ln>
+        </p:spPr>
+        <p:style>
+          <a:lnRef idx="1">
+            <a:schemeClr val="accent1"/>
+          </a:lnRef>
+          <a:fillRef idx="0">
+            <a:schemeClr val="accent1"/>
+          </a:fillRef>
+          <a:effectRef idx="0">
+            <a:schemeClr val="accent1"/>
+          </a:effectRef>
+          <a:fontRef idx="minor">
+            <a:schemeClr val="tx1"/>
+          </a:fontRef>
+        </p:style>
+      </p:cxnSp>
+      <p:cxnSp>
+        <p:nvCxnSpPr>
+          <p:cNvPr id="45" name="Elbow Connector 44"/>
+          <p:cNvCxnSpPr>
+            <a:stCxn id="14" idx="2"/>
+            <a:endCxn id="17" idx="2"/>
+          </p:cNvCxnSpPr>
+          <p:nvPr/>
+        </p:nvCxnSpPr>
+        <p:spPr>
+          <a:xfrm rot="16200000" flipH="1">
+            <a:off x="4572000" y="2708920"/>
+            <a:ext cx="1588" cy="7200800"/>
+          </a:xfrm>
+          <a:prstGeom prst="bentConnector3">
+            <a:avLst>
+              <a:gd name="adj1" fmla="val 31235463"/>
+            </a:avLst>
+          </a:prstGeom>
+          <a:ln w="38100">
+            <a:solidFill>
+              <a:schemeClr val="accent3"/>
+            </a:solidFill>
+            <a:headEnd type="arrow"/>
+            <a:tailEnd type="arrow"/>
+          </a:ln>
+        </p:spPr>
+        <p:style>
+          <a:lnRef idx="1">
+            <a:schemeClr val="accent1"/>
+          </a:lnRef>
+          <a:fillRef idx="0">
+            <a:schemeClr val="accent1"/>
+          </a:fillRef>
+          <a:effectRef idx="0">
+            <a:schemeClr val="accent1"/>
+          </a:effectRef>
+          <a:fontRef idx="minor">
+            <a:schemeClr val="tx1"/>
+          </a:fontRef>
+        </p:style>
+      </p:cxnSp>
+      <p:cxnSp>
+        <p:nvCxnSpPr>
+          <p:cNvPr id="49" name="Elbow Connector 48"/>
+          <p:cNvCxnSpPr>
+            <a:stCxn id="15" idx="2"/>
+            <a:endCxn id="17" idx="2"/>
+          </p:cNvCxnSpPr>
+          <p:nvPr/>
+        </p:nvCxnSpPr>
+        <p:spPr>
+          <a:xfrm rot="16200000" flipH="1">
+            <a:off x="5652120" y="3789040"/>
+            <a:ext cx="1588" cy="5040560"/>
+          </a:xfrm>
+          <a:prstGeom prst="bentConnector3">
+            <a:avLst>
+              <a:gd name="adj1" fmla="val 19284452"/>
+            </a:avLst>
+          </a:prstGeom>
+          <a:ln w="38100">
+            <a:solidFill>
+              <a:schemeClr val="accent3"/>
+            </a:solidFill>
+            <a:headEnd type="arrow"/>
+            <a:tailEnd type="arrow"/>
+          </a:ln>
+        </p:spPr>
+        <p:style>
+          <a:lnRef idx="1">
+            <a:schemeClr val="accent1"/>
+          </a:lnRef>
+          <a:fillRef idx="0">
+            <a:schemeClr val="accent1"/>
+          </a:fillRef>
+          <a:effectRef idx="0">
+            <a:schemeClr val="accent1"/>
+          </a:effectRef>
+          <a:fontRef idx="minor">
+            <a:schemeClr val="tx1"/>
+          </a:fontRef>
+        </p:style>
+      </p:cxnSp>
+      <p:cxnSp>
+        <p:nvCxnSpPr>
+          <p:cNvPr id="52" name="Elbow Connector 51"/>
+          <p:cNvCxnSpPr>
+            <a:stCxn id="14" idx="2"/>
+            <a:endCxn id="16" idx="2"/>
+          </p:cNvCxnSpPr>
+          <p:nvPr/>
+        </p:nvCxnSpPr>
+        <p:spPr>
+          <a:xfrm rot="16200000" flipH="1">
+            <a:off x="3491880" y="3789040"/>
+            <a:ext cx="1588" cy="5040560"/>
+          </a:xfrm>
+          <a:prstGeom prst="bentConnector3">
+            <a:avLst>
+              <a:gd name="adj1" fmla="val 24173559"/>
+            </a:avLst>
+          </a:prstGeom>
+          <a:ln w="38100">
+            <a:solidFill>
+              <a:schemeClr val="accent3"/>
+            </a:solidFill>
+            <a:headEnd type="arrow"/>
+            <a:tailEnd type="arrow"/>
+          </a:ln>
+        </p:spPr>
+        <p:style>
+          <a:lnRef idx="1">
+            <a:schemeClr val="accent1"/>
+          </a:lnRef>
+          <a:fillRef idx="0">
+            <a:schemeClr val="accent1"/>
+          </a:fillRef>
+          <a:effectRef idx="0">
+            <a:schemeClr val="accent1"/>
+          </a:effectRef>
+          <a:fontRef idx="minor">
+            <a:schemeClr val="tx1"/>
+          </a:fontRef>
+        </p:style>
+      </p:cxnSp>
+      <p:sp>
+        <p:nvSpPr>
+          <p:cNvPr id="56" name="TextBox 55"/>
+          <p:cNvSpPr txBox="1"/>
+          <p:nvPr/>
+        </p:nvSpPr>
+        <p:spPr>
+          <a:xfrm>
+            <a:off x="4283968" y="6093296"/>
+            <a:ext cx="558166" cy="369332"/>
+          </a:xfrm>
+          <a:prstGeom prst="rect">
+            <a:avLst/>
+          </a:prstGeom>
+          <a:noFill/>
+        </p:spPr>
+        <p:txBody>
+          <a:bodyPr wrap="none" rtlCol="0">
+            <a:spAutoFit/>
+          </a:bodyPr>
+          <a:lstStyle/>
+          <a:p>
+            <a:r>
+              <a:rPr lang="en-NZ" dirty="0" smtClean="0">
+                <a:solidFill>
+                  <a:schemeClr val="accent3"/>
+                </a:solidFill>
+              </a:rPr>
+              <a:t>MPI</a:t>
+            </a:r>
+            <a:endParaRPr lang="en-NZ" dirty="0">
+              <a:solidFill>
+                <a:schemeClr val="accent3"/>
+              </a:solidFill>
+            </a:endParaRPr>
+          </a:p>
+        </p:txBody>
+      </p:sp>
+      <p:sp>
+        <p:nvSpPr>
+          <p:cNvPr id="57" name="TextBox 56"/>
+          <p:cNvSpPr txBox="1"/>
+          <p:nvPr/>
+        </p:nvSpPr>
+        <p:spPr>
+          <a:xfrm>
+            <a:off x="3995936" y="404664"/>
+            <a:ext cx="1196225" cy="646331"/>
+          </a:xfrm>
+          <a:prstGeom prst="rect">
+            <a:avLst/>
+          </a:prstGeom>
+          <a:noFill/>
+        </p:spPr>
+        <p:txBody>
+          <a:bodyPr wrap="none" rtlCol="0">
+            <a:spAutoFit/>
+          </a:bodyPr>
+          <a:lstStyle/>
+          <a:p>
+            <a:pPr algn="ctr"/>
+            <a:r>
+              <a:rPr lang="en-NZ" dirty="0" smtClean="0">
+                <a:solidFill>
+                  <a:schemeClr val="accent4"/>
+                </a:solidFill>
+              </a:rPr>
+              <a:t>WCF on</a:t>
+            </a:r>
+          </a:p>
+          <a:p>
+            <a:pPr algn="ctr"/>
+            <a:r>
+              <a:rPr lang="en-NZ" dirty="0" smtClean="0">
+                <a:solidFill>
+                  <a:schemeClr val="accent4"/>
+                </a:solidFill>
+              </a:rPr>
+              <a:t>TCP or P2P</a:t>
+            </a:r>
+            <a:endParaRPr lang="en-NZ" dirty="0">
+              <a:solidFill>
+                <a:schemeClr val="accent4"/>
+              </a:solidFill>
+            </a:endParaRPr>
+          </a:p>
+        </p:txBody>
+      </p:sp>
+      <p:sp>
+        <p:nvSpPr>
+          <p:cNvPr id="58" name="TextBox 57"/>
+          <p:cNvSpPr txBox="1"/>
+          <p:nvPr/>
+        </p:nvSpPr>
+        <p:spPr>
+          <a:xfrm>
+            <a:off x="2123728" y="1988840"/>
+            <a:ext cx="1393330" cy="646331"/>
+          </a:xfrm>
+          <a:prstGeom prst="rect">
+            <a:avLst/>
+          </a:prstGeom>
+          <a:noFill/>
+        </p:spPr>
+        <p:txBody>
+          <a:bodyPr wrap="square" rtlCol="0">
+            <a:spAutoFit/>
+          </a:bodyPr>
+          <a:lstStyle/>
+          <a:p>
+            <a:r>
+              <a:rPr lang="en-NZ" dirty="0" smtClean="0">
+                <a:solidFill>
+                  <a:schemeClr val="accent1"/>
+                </a:solidFill>
+              </a:rPr>
+              <a:t>WCF on</a:t>
+            </a:r>
+          </a:p>
+          <a:p>
+            <a:r>
+              <a:rPr lang="en-NZ" dirty="0" smtClean="0">
+                <a:solidFill>
+                  <a:schemeClr val="accent1"/>
+                </a:solidFill>
+              </a:rPr>
+              <a:t>named pipes</a:t>
+            </a:r>
           </a:p>
         </p:txBody>
       </p:sp>

</xml_diff>